<commit_message>
ppt colour scheme change
</commit_message>
<xml_diff>
--- a/CLIC_SARGENT.pptx
+++ b/CLIC_SARGENT.pptx
@@ -107,7 +107,16 @@
       </a:defRPr>
     </a:lvl9pPr>
   </p:defaultTextStyle>
+  <p:extLst>
+    <p:ext uri="{EFAFB233-063F-42B5-8137-9DF3F51BA10A}">
+      <p15:sldGuideLst xmlns:p15="http://schemas.microsoft.com/office/powerpoint/2012/main"/>
+    </p:ext>
+  </p:extLst>
 </p:presentation>
+</file>
+
+<file path=ppt/revisionInfo.xml><?xml version="1.0" encoding="utf-8"?>
+<p1510:revInfo xmlns:a="http://schemas.openxmlformats.org/drawingml/2006/main" xmlns:r="http://schemas.openxmlformats.org/officeDocument/2006/relationships" xmlns:p1510="http://schemas.microsoft.com/office/powerpoint/2015/10/main"/>
 </file>
 
 <file path=ppt/slideLayouts/slideLayout1.xml><?xml version="1.0" encoding="utf-8"?>
@@ -205,7 +214,7 @@
           <a:effectLst/>
           <a:extLst>
             <a:ext uri="{91240B29-F687-4f45-9708-019B960494DF}">
-              <a14:hiddenLine xmlns="" xmlns:a14="http://schemas.microsoft.com/office/drawing/2010/main" w="9525">
+              <a14:hiddenLine xmlns:a14="http://schemas.microsoft.com/office/drawing/2010/main" xmlns="" w="9525">
                 <a:solidFill>
                   <a:srgbClr val="000000"/>
                 </a:solidFill>
@@ -398,7 +407,7 @@
             <a:fld id="{08B9EBBA-996F-894A-B54A-D6246ED52CEA}" type="datetimeFigureOut">
               <a:rPr lang="en-US" dirty="0"/>
               <a:pPr/>
-              <a:t>11/17/2017</a:t>
+              <a:t>11/18/2017</a:t>
             </a:fld>
             <a:endParaRPr lang="en-US" dirty="0"/>
           </a:p>
@@ -713,7 +722,7 @@
             <a:fld id="{18C79C5D-2A6F-F04D-97DA-BEF2467B64E4}" type="datetimeFigureOut">
               <a:rPr lang="en-US" dirty="0"/>
               <a:pPr/>
-              <a:t>11/17/2017</a:t>
+              <a:t>11/18/2017</a:t>
             </a:fld>
             <a:endParaRPr lang="en-US" dirty="0"/>
           </a:p>
@@ -1198,7 +1207,7 @@
             <a:fld id="{8DFA1846-DA80-1C48-A609-854EA85C59AD}" type="datetimeFigureOut">
               <a:rPr lang="en-US" dirty="0"/>
               <a:pPr/>
-              <a:t>11/17/2017</a:t>
+              <a:t>11/18/2017</a:t>
             </a:fld>
             <a:endParaRPr lang="en-US" dirty="0"/>
           </a:p>
@@ -1564,7 +1573,7 @@
             <a:fld id="{FBF54567-0DE4-3F47-BF90-CB84690072F9}" type="datetimeFigureOut">
               <a:rPr lang="en-US" dirty="0"/>
               <a:pPr/>
-              <a:t>11/17/2017</a:t>
+              <a:t>11/18/2017</a:t>
             </a:fld>
             <a:endParaRPr lang="en-US" dirty="0"/>
           </a:p>
@@ -1715,7 +1724,7 @@
           <a:ln/>
           <a:extLst>
             <a:ext uri="{91240B29-F687-4f45-9708-019B960494DF}">
-              <a14:hiddenLine xmlns="" xmlns:a14="http://schemas.microsoft.com/office/drawing/2010/main" w="9525">
+              <a14:hiddenLine xmlns:a14="http://schemas.microsoft.com/office/drawing/2010/main" xmlns="" w="9525">
                 <a:solidFill>
                   <a:srgbClr val="000000"/>
                 </a:solidFill>
@@ -1834,7 +1843,7 @@
             <a:fld id="{C6C52C72-DE31-F449-A4ED-4C594FD91407}" type="datetimeFigureOut">
               <a:rPr lang="en-US" dirty="0"/>
               <a:pPr/>
-              <a:t>11/17/2017</a:t>
+              <a:t>11/18/2017</a:t>
             </a:fld>
             <a:endParaRPr lang="en-US" dirty="0"/>
           </a:p>
@@ -1987,7 +1996,7 @@
           <a:ln/>
           <a:extLst>
             <a:ext uri="{91240B29-F687-4f45-9708-019B960494DF}">
-              <a14:hiddenLine xmlns="" xmlns:a14="http://schemas.microsoft.com/office/drawing/2010/main" w="9525">
+              <a14:hiddenLine xmlns:a14="http://schemas.microsoft.com/office/drawing/2010/main" xmlns="" w="9525">
                 <a:solidFill>
                   <a:srgbClr val="000000"/>
                 </a:solidFill>
@@ -2116,7 +2125,7 @@
             <a:fld id="{ED62726E-379B-B349-9EED-81ED093FA806}" type="datetimeFigureOut">
               <a:rPr lang="en-US" dirty="0"/>
               <a:pPr/>
-              <a:t>11/17/2017</a:t>
+              <a:t>11/18/2017</a:t>
             </a:fld>
             <a:endParaRPr lang="en-US" dirty="0"/>
           </a:p>
@@ -2267,7 +2276,7 @@
           <a:ln/>
           <a:extLst>
             <a:ext uri="{91240B29-F687-4f45-9708-019B960494DF}">
-              <a14:hiddenLine xmlns="" xmlns:a14="http://schemas.microsoft.com/office/drawing/2010/main" w="9525">
+              <a14:hiddenLine xmlns:a14="http://schemas.microsoft.com/office/drawing/2010/main" xmlns="" w="9525">
                 <a:solidFill>
                   <a:srgbClr val="000000"/>
                 </a:solidFill>
@@ -2396,7 +2405,7 @@
             <a:fld id="{9B3A1323-8D79-1946-B0D7-40001CF92E9D}" type="datetimeFigureOut">
               <a:rPr lang="en-US" dirty="0"/>
               <a:pPr/>
-              <a:t>11/17/2017</a:t>
+              <a:t>11/18/2017</a:t>
             </a:fld>
             <a:endParaRPr lang="en-US" dirty="0"/>
           </a:p>
@@ -2736,7 +2745,7 @@
             <a:fld id="{8DFA1846-DA80-1C48-A609-854EA85C59AD}" type="datetimeFigureOut">
               <a:rPr lang="en-US" dirty="0"/>
               <a:pPr/>
-              <a:t>11/17/2017</a:t>
+              <a:t>11/18/2017</a:t>
             </a:fld>
             <a:endParaRPr lang="en-US" dirty="0"/>
           </a:p>
@@ -2887,7 +2896,7 @@
           <a:ln/>
           <a:extLst>
             <a:ext uri="{91240B29-F687-4f45-9708-019B960494DF}">
-              <a14:hiddenLine xmlns="" xmlns:a14="http://schemas.microsoft.com/office/drawing/2010/main" w="9525">
+              <a14:hiddenLine xmlns:a14="http://schemas.microsoft.com/office/drawing/2010/main" xmlns="" w="9525">
                 <a:solidFill>
                   <a:srgbClr val="000000"/>
                 </a:solidFill>
@@ -3072,7 +3081,7 @@
             <a:fld id="{57302355-E14B-8545-A8F8-0FE83CC9D524}" type="datetimeFigureOut">
               <a:rPr lang="en-US" dirty="0"/>
               <a:pPr/>
-              <a:t>11/17/2017</a:t>
+              <a:t>11/18/2017</a:t>
             </a:fld>
             <a:endParaRPr lang="en-US" dirty="0"/>
           </a:p>
@@ -3223,7 +3232,7 @@
           <a:ln/>
           <a:extLst>
             <a:ext uri="{91240B29-F687-4f45-9708-019B960494DF}">
-              <a14:hiddenLine xmlns="" xmlns:a14="http://schemas.microsoft.com/office/drawing/2010/main" w="9525">
+              <a14:hiddenLine xmlns:a14="http://schemas.microsoft.com/office/drawing/2010/main" xmlns="" w="9525">
                 <a:solidFill>
                   <a:srgbClr val="000000"/>
                 </a:solidFill>
@@ -3546,7 +3555,7 @@
             <a:fld id="{02640F58-564D-2B4F-AE67-E407BA4FCF45}" type="datetimeFigureOut">
               <a:rPr lang="en-US" dirty="0"/>
               <a:pPr/>
-              <a:t>11/17/2017</a:t>
+              <a:t>11/18/2017</a:t>
             </a:fld>
             <a:endParaRPr lang="en-US" dirty="0"/>
           </a:p>
@@ -3697,7 +3706,7 @@
           <a:ln/>
           <a:extLst>
             <a:ext uri="{91240B29-F687-4f45-9708-019B960494DF}">
-              <a14:hiddenLine xmlns="" xmlns:a14="http://schemas.microsoft.com/office/drawing/2010/main" w="9525">
+              <a14:hiddenLine xmlns:a14="http://schemas.microsoft.com/office/drawing/2010/main" xmlns="" w="9525">
                 <a:solidFill>
                   <a:srgbClr val="000000"/>
                 </a:solidFill>
@@ -3764,7 +3773,7 @@
             <a:fld id="{F13A34C8-038E-2045-AF43-DF7DBB8E0E9E}" type="datetimeFigureOut">
               <a:rPr lang="en-US" dirty="0"/>
               <a:pPr/>
-              <a:t>11/17/2017</a:t>
+              <a:t>11/18/2017</a:t>
             </a:fld>
             <a:endParaRPr lang="en-US" dirty="0"/>
           </a:p>
@@ -3856,7 +3865,7 @@
             <a:fld id="{8818C68F-D26B-8F47-958C-23B49CF8A634}" type="datetimeFigureOut">
               <a:rPr lang="en-US" dirty="0"/>
               <a:pPr/>
-              <a:t>11/17/2017</a:t>
+              <a:t>11/18/2017</a:t>
             </a:fld>
             <a:endParaRPr lang="en-US" dirty="0"/>
           </a:p>
@@ -4120,7 +4129,7 @@
           <a:ln/>
           <a:extLst>
             <a:ext uri="{91240B29-F687-4f45-9708-019B960494DF}">
-              <a14:hiddenLine xmlns="" xmlns:a14="http://schemas.microsoft.com/office/drawing/2010/main" w="9525">
+              <a14:hiddenLine xmlns:a14="http://schemas.microsoft.com/office/drawing/2010/main" xmlns="" w="9525">
                 <a:solidFill>
                   <a:srgbClr val="000000"/>
                 </a:solidFill>
@@ -4320,7 +4329,7 @@
             <a:fld id="{D0DF5E60-9974-AC48-9591-99C2BB44B7CF}" type="datetimeFigureOut">
               <a:rPr lang="en-US" dirty="0"/>
               <a:pPr/>
-              <a:t>11/17/2017</a:t>
+              <a:t>11/18/2017</a:t>
             </a:fld>
             <a:endParaRPr lang="en-US" dirty="0"/>
           </a:p>
@@ -4630,7 +4639,7 @@
             <a:fld id="{18C79C5D-2A6F-F04D-97DA-BEF2467B64E4}" type="datetimeFigureOut">
               <a:rPr lang="en-US" dirty="0"/>
               <a:pPr/>
-              <a:t>11/17/2017</a:t>
+              <a:t>11/18/2017</a:t>
             </a:fld>
             <a:endParaRPr lang="en-US" dirty="0"/>
           </a:p>
@@ -4897,7 +4906,7 @@
             <a:fld id="{09B482E8-6E0E-1B4F-B1FD-C69DB9E858D9}" type="datetimeFigureOut">
               <a:rPr lang="en-US" dirty="0"/>
               <a:pPr/>
-              <a:t>11/17/2017</a:t>
+              <a:t>11/18/2017</a:t>
             </a:fld>
             <a:endParaRPr lang="en-US" dirty="0"/>
           </a:p>
@@ -5683,7 +5692,7 @@
 <file path=ppt/theme/theme1.xml><?xml version="1.0" encoding="utf-8"?>
 <a:theme xmlns:a="http://schemas.openxmlformats.org/drawingml/2006/main" name="Quotable">
   <a:themeElements>
-    <a:clrScheme name="Quotable">
+    <a:clrScheme name="Custom 2">
       <a:dk1>
         <a:sysClr val="windowText" lastClr="000000"/>
       </a:dk1>
@@ -5697,10 +5706,10 @@
         <a:srgbClr val="636363"/>
       </a:lt2>
       <a:accent1>
-        <a:srgbClr val="F03B5E"/>
+        <a:srgbClr val="E24ACC"/>
       </a:accent1>
       <a:accent2>
-        <a:srgbClr val="DC6FEC"/>
+        <a:srgbClr val="C922E1"/>
       </a:accent2>
       <a:accent3>
         <a:srgbClr val="60B1F2"/>

</xml_diff>